<commit_message>
Erweiterung Powerpoint und Dokumentation
</commit_message>
<xml_diff>
--- a/Präsentation.pptx
+++ b/Präsentation.pptx
@@ -18740,12 +18740,8 @@
           </a:p>
           <a:p>
             <a:r>
-              <a:rPr lang="de-DE" dirty="0"/>
-              <a:t>Denise </a:t>
-            </a:r>
-            <a:r>
-              <a:rPr lang="de-DE" dirty="0" err="1"/>
-              <a:t>Langhals</a:t>
+              <a:rPr lang="de-DE"/>
+              <a:t>Denise Langhof</a:t>
             </a:r>
             <a:endParaRPr lang="de-DE" dirty="0"/>
           </a:p>

</xml_diff>

<commit_message>
Änderung Doku und Präsi
</commit_message>
<xml_diff>
--- a/Präsentation.pptx
+++ b/Präsentation.pptx
@@ -5781,7 +5781,7 @@
             <a:fld id="{B34F82CB-3DB3-4712-8EBD-9216A2F859CE}" type="datetimeFigureOut">
               <a:rPr lang="de-DE" altLang="de-DE"/>
               <a:pPr/>
-              <a:t>27.01.2019</a:t>
+              <a:t>01.02.2019</a:t>
             </a:fld>
             <a:endParaRPr lang="de-DE" altLang="de-DE"/>
           </a:p>
@@ -19002,7 +19002,7 @@
                   </a:outerShdw>
                 </a:effectLst>
               </a:rPr>
-              <a:t>Simulation der Ausbreitung von Pest in den Jahren 1347-1450 in Europa</a:t>
+              <a:t>Simulation der Auswirkungen von Pest in den Jahren 1347-1450 in Europa</a:t>
             </a:r>
             <a:br>
               <a:rPr lang="de-DE" sz="3200" b="1" dirty="0"/>

</xml_diff>